<commit_message>
PDF and changes to notebook
</commit_message>
<xml_diff>
--- a/Project 3 Final/Presentation/Data Visualisation Project.pptx
+++ b/Project 3 Final/Presentation/Data Visualisation Project.pptx
@@ -109,7 +109,164 @@
       </a:defRPr>
     </a:lvl9pPr>
   </p:defaultTextStyle>
+  <p:extLst>
+    <p:ext uri="{EFAFB233-063F-42B5-8137-9DF3F51BA10A}">
+      <p15:sldGuideLst xmlns:p15="http://schemas.microsoft.com/office/powerpoint/2012/main"/>
+    </p:ext>
+  </p:extLst>
 </p:presentation>
+</file>
+
+<file path=ppt/changesInfos/changesInfo1.xml><?xml version="1.0" encoding="utf-8"?>
+<pc:chgInfo xmlns:a="http://schemas.openxmlformats.org/drawingml/2006/main" xmlns:r="http://schemas.openxmlformats.org/officeDocument/2006/relationships" xmlns:ac="http://schemas.microsoft.com/office/drawing/2013/main/command" xmlns:pc="http://schemas.microsoft.com/office/powerpoint/2013/main/command">
+  <pc:docChgLst>
+    <pc:chgData name="Hail Nijo" userId="90b1d31e05af163a" providerId="LiveId" clId="{DFADF12D-90F6-4FD4-972F-4B70FA0C3240}"/>
+    <pc:docChg chg="undo custSel modSld">
+      <pc:chgData name="Hail Nijo" userId="90b1d31e05af163a" providerId="LiveId" clId="{DFADF12D-90F6-4FD4-972F-4B70FA0C3240}" dt="2024-03-18T11:02:26.698" v="398" actId="20577"/>
+      <pc:docMkLst>
+        <pc:docMk/>
+      </pc:docMkLst>
+      <pc:sldChg chg="modSp mod">
+        <pc:chgData name="Hail Nijo" userId="90b1d31e05af163a" providerId="LiveId" clId="{DFADF12D-90F6-4FD4-972F-4B70FA0C3240}" dt="2024-03-18T10:38:37.939" v="18" actId="20577"/>
+        <pc:sldMkLst>
+          <pc:docMk/>
+          <pc:sldMk cId="345086498" sldId="256"/>
+        </pc:sldMkLst>
+        <pc:spChg chg="mod">
+          <ac:chgData name="Hail Nijo" userId="90b1d31e05af163a" providerId="LiveId" clId="{DFADF12D-90F6-4FD4-972F-4B70FA0C3240}" dt="2024-03-18T10:38:37.939" v="18" actId="20577"/>
+          <ac:spMkLst>
+            <pc:docMk/>
+            <pc:sldMk cId="345086498" sldId="256"/>
+            <ac:spMk id="2" creationId="{25245047-D62C-6653-808B-255D5F2C4B85}"/>
+          </ac:spMkLst>
+        </pc:spChg>
+        <pc:spChg chg="mod">
+          <ac:chgData name="Hail Nijo" userId="90b1d31e05af163a" providerId="LiveId" clId="{DFADF12D-90F6-4FD4-972F-4B70FA0C3240}" dt="2024-03-18T10:38:20.483" v="4" actId="20577"/>
+          <ac:spMkLst>
+            <pc:docMk/>
+            <pc:sldMk cId="345086498" sldId="256"/>
+            <ac:spMk id="3" creationId="{C55F8946-0E8E-DB05-757A-C7F0048FF29F}"/>
+          </ac:spMkLst>
+        </pc:spChg>
+      </pc:sldChg>
+      <pc:sldChg chg="modSp mod">
+        <pc:chgData name="Hail Nijo" userId="90b1d31e05af163a" providerId="LiveId" clId="{DFADF12D-90F6-4FD4-972F-4B70FA0C3240}" dt="2024-03-18T10:39:44.683" v="20" actId="20577"/>
+        <pc:sldMkLst>
+          <pc:docMk/>
+          <pc:sldMk cId="564059049" sldId="257"/>
+        </pc:sldMkLst>
+        <pc:spChg chg="mod">
+          <ac:chgData name="Hail Nijo" userId="90b1d31e05af163a" providerId="LiveId" clId="{DFADF12D-90F6-4FD4-972F-4B70FA0C3240}" dt="2024-03-18T10:39:44.683" v="20" actId="20577"/>
+          <ac:spMkLst>
+            <pc:docMk/>
+            <pc:sldMk cId="564059049" sldId="257"/>
+            <ac:spMk id="2" creationId="{25245047-D62C-6653-808B-255D5F2C4B85}"/>
+          </ac:spMkLst>
+        </pc:spChg>
+      </pc:sldChg>
+      <pc:sldChg chg="modSp mod">
+        <pc:chgData name="Hail Nijo" userId="90b1d31e05af163a" providerId="LiveId" clId="{DFADF12D-90F6-4FD4-972F-4B70FA0C3240}" dt="2024-03-18T10:40:37.156" v="39" actId="20577"/>
+        <pc:sldMkLst>
+          <pc:docMk/>
+          <pc:sldMk cId="36623740" sldId="258"/>
+        </pc:sldMkLst>
+        <pc:spChg chg="mod">
+          <ac:chgData name="Hail Nijo" userId="90b1d31e05af163a" providerId="LiveId" clId="{DFADF12D-90F6-4FD4-972F-4B70FA0C3240}" dt="2024-03-18T10:40:37.156" v="39" actId="20577"/>
+          <ac:spMkLst>
+            <pc:docMk/>
+            <pc:sldMk cId="36623740" sldId="258"/>
+            <ac:spMk id="2" creationId="{25245047-D62C-6653-808B-255D5F2C4B85}"/>
+          </ac:spMkLst>
+        </pc:spChg>
+      </pc:sldChg>
+      <pc:sldChg chg="addSp modSp mod">
+        <pc:chgData name="Hail Nijo" userId="90b1d31e05af163a" providerId="LiveId" clId="{DFADF12D-90F6-4FD4-972F-4B70FA0C3240}" dt="2024-03-18T11:02:26.698" v="398" actId="20577"/>
+        <pc:sldMkLst>
+          <pc:docMk/>
+          <pc:sldMk cId="2547390304" sldId="259"/>
+        </pc:sldMkLst>
+        <pc:spChg chg="mod">
+          <ac:chgData name="Hail Nijo" userId="90b1d31e05af163a" providerId="LiveId" clId="{DFADF12D-90F6-4FD4-972F-4B70FA0C3240}" dt="2024-03-18T11:02:26.698" v="398" actId="20577"/>
+          <ac:spMkLst>
+            <pc:docMk/>
+            <pc:sldMk cId="2547390304" sldId="259"/>
+            <ac:spMk id="21" creationId="{6BD3C77A-39FC-4068-941F-0E6E92E625CC}"/>
+          </ac:spMkLst>
+        </pc:spChg>
+        <pc:picChg chg="add mod">
+          <ac:chgData name="Hail Nijo" userId="90b1d31e05af163a" providerId="LiveId" clId="{DFADF12D-90F6-4FD4-972F-4B70FA0C3240}" dt="2024-03-18T11:01:38.892" v="280" actId="1076"/>
+          <ac:picMkLst>
+            <pc:docMk/>
+            <pc:sldMk cId="2547390304" sldId="259"/>
+            <ac:picMk id="3" creationId="{07454272-5128-CC0C-7CD8-20F045D05F91}"/>
+          </ac:picMkLst>
+        </pc:picChg>
+        <pc:picChg chg="mod">
+          <ac:chgData name="Hail Nijo" userId="90b1d31e05af163a" providerId="LiveId" clId="{DFADF12D-90F6-4FD4-972F-4B70FA0C3240}" dt="2024-03-18T11:01:33.878" v="279" actId="1076"/>
+          <ac:picMkLst>
+            <pc:docMk/>
+            <pc:sldMk cId="2547390304" sldId="259"/>
+            <ac:picMk id="19" creationId="{1823AF82-A180-6FD2-7D12-56A685121E9A}"/>
+          </ac:picMkLst>
+        </pc:picChg>
+      </pc:sldChg>
+      <pc:sldChg chg="addSp delSp modSp mod">
+        <pc:chgData name="Hail Nijo" userId="90b1d31e05af163a" providerId="LiveId" clId="{DFADF12D-90F6-4FD4-972F-4B70FA0C3240}" dt="2024-03-18T10:51:32.408" v="101" actId="1076"/>
+        <pc:sldMkLst>
+          <pc:docMk/>
+          <pc:sldMk cId="1912092950" sldId="260"/>
+        </pc:sldMkLst>
+        <pc:spChg chg="mod">
+          <ac:chgData name="Hail Nijo" userId="90b1d31e05af163a" providerId="LiveId" clId="{DFADF12D-90F6-4FD4-972F-4B70FA0C3240}" dt="2024-03-18T10:51:11.904" v="91" actId="1076"/>
+          <ac:spMkLst>
+            <pc:docMk/>
+            <pc:sldMk cId="1912092950" sldId="260"/>
+            <ac:spMk id="2" creationId="{6BB48C5A-E49A-1990-F561-A725F7CE3AA6}"/>
+          </ac:spMkLst>
+        </pc:spChg>
+        <pc:picChg chg="add del mod">
+          <ac:chgData name="Hail Nijo" userId="90b1d31e05af163a" providerId="LiveId" clId="{DFADF12D-90F6-4FD4-972F-4B70FA0C3240}" dt="2024-03-18T10:51:12.728" v="93" actId="22"/>
+          <ac:picMkLst>
+            <pc:docMk/>
+            <pc:sldMk cId="1912092950" sldId="260"/>
+            <ac:picMk id="4" creationId="{9B984DB4-1F02-1CBE-3833-C70C2BAB3EDC}"/>
+          </ac:picMkLst>
+        </pc:picChg>
+        <pc:picChg chg="add mod">
+          <ac:chgData name="Hail Nijo" userId="90b1d31e05af163a" providerId="LiveId" clId="{DFADF12D-90F6-4FD4-972F-4B70FA0C3240}" dt="2024-03-18T10:51:32.408" v="101" actId="1076"/>
+          <ac:picMkLst>
+            <pc:docMk/>
+            <pc:sldMk cId="1912092950" sldId="260"/>
+            <ac:picMk id="8" creationId="{CE8AE913-850F-E05E-1A8C-D3D76989F511}"/>
+          </ac:picMkLst>
+        </pc:picChg>
+        <pc:picChg chg="add del mod">
+          <ac:chgData name="Hail Nijo" userId="90b1d31e05af163a" providerId="LiveId" clId="{DFADF12D-90F6-4FD4-972F-4B70FA0C3240}" dt="2024-03-18T10:51:19.794" v="97" actId="1076"/>
+          <ac:picMkLst>
+            <pc:docMk/>
+            <pc:sldMk cId="1912092950" sldId="260"/>
+            <ac:picMk id="17" creationId="{C7A9A240-663B-2DE5-0153-FD48299ED062}"/>
+          </ac:picMkLst>
+        </pc:picChg>
+      </pc:sldChg>
+      <pc:sldChg chg="modSp mod">
+        <pc:chgData name="Hail Nijo" userId="90b1d31e05af163a" providerId="LiveId" clId="{DFADF12D-90F6-4FD4-972F-4B70FA0C3240}" dt="2024-03-18T10:43:12.065" v="40" actId="1076"/>
+        <pc:sldMkLst>
+          <pc:docMk/>
+          <pc:sldMk cId="2946322319" sldId="261"/>
+        </pc:sldMkLst>
+        <pc:spChg chg="mod">
+          <ac:chgData name="Hail Nijo" userId="90b1d31e05af163a" providerId="LiveId" clId="{DFADF12D-90F6-4FD4-972F-4B70FA0C3240}" dt="2024-03-18T10:43:12.065" v="40" actId="1076"/>
+          <ac:spMkLst>
+            <pc:docMk/>
+            <pc:sldMk cId="2946322319" sldId="261"/>
+            <ac:spMk id="21" creationId="{6BD3C77A-39FC-4068-941F-0E6E92E625CC}"/>
+          </ac:spMkLst>
+        </pc:spChg>
+      </pc:sldChg>
+    </pc:docChg>
+  </pc:docChgLst>
+</pc:chgInfo>
 </file>
 
 <file path=ppt/slideLayouts/slideLayout1.xml><?xml version="1.0" encoding="utf-8"?>
@@ -261,7 +418,7 @@
           <a:p>
             <a:fld id="{DB35434F-B9E8-4EF6-A868-09CDA957E3B0}" type="datetimeFigureOut">
               <a:rPr lang="en-AU" smtClean="0"/>
-              <a:t>17/03/2024</a:t>
+              <a:t>18/03/2024</a:t>
             </a:fld>
             <a:endParaRPr lang="en-AU"/>
           </a:p>
@@ -461,7 +618,7 @@
           <a:p>
             <a:fld id="{DB35434F-B9E8-4EF6-A868-09CDA957E3B0}" type="datetimeFigureOut">
               <a:rPr lang="en-AU" smtClean="0"/>
-              <a:t>17/03/2024</a:t>
+              <a:t>18/03/2024</a:t>
             </a:fld>
             <a:endParaRPr lang="en-AU"/>
           </a:p>
@@ -671,7 +828,7 @@
           <a:p>
             <a:fld id="{DB35434F-B9E8-4EF6-A868-09CDA957E3B0}" type="datetimeFigureOut">
               <a:rPr lang="en-AU" smtClean="0"/>
-              <a:t>17/03/2024</a:t>
+              <a:t>18/03/2024</a:t>
             </a:fld>
             <a:endParaRPr lang="en-AU"/>
           </a:p>
@@ -871,7 +1028,7 @@
           <a:p>
             <a:fld id="{DB35434F-B9E8-4EF6-A868-09CDA957E3B0}" type="datetimeFigureOut">
               <a:rPr lang="en-AU" smtClean="0"/>
-              <a:t>17/03/2024</a:t>
+              <a:t>18/03/2024</a:t>
             </a:fld>
             <a:endParaRPr lang="en-AU"/>
           </a:p>
@@ -1147,7 +1304,7 @@
           <a:p>
             <a:fld id="{DB35434F-B9E8-4EF6-A868-09CDA957E3B0}" type="datetimeFigureOut">
               <a:rPr lang="en-AU" smtClean="0"/>
-              <a:t>17/03/2024</a:t>
+              <a:t>18/03/2024</a:t>
             </a:fld>
             <a:endParaRPr lang="en-AU"/>
           </a:p>
@@ -1415,7 +1572,7 @@
           <a:p>
             <a:fld id="{DB35434F-B9E8-4EF6-A868-09CDA957E3B0}" type="datetimeFigureOut">
               <a:rPr lang="en-AU" smtClean="0"/>
-              <a:t>17/03/2024</a:t>
+              <a:t>18/03/2024</a:t>
             </a:fld>
             <a:endParaRPr lang="en-AU"/>
           </a:p>
@@ -1830,7 +1987,7 @@
           <a:p>
             <a:fld id="{DB35434F-B9E8-4EF6-A868-09CDA957E3B0}" type="datetimeFigureOut">
               <a:rPr lang="en-AU" smtClean="0"/>
-              <a:t>17/03/2024</a:t>
+              <a:t>18/03/2024</a:t>
             </a:fld>
             <a:endParaRPr lang="en-AU"/>
           </a:p>
@@ -1972,7 +2129,7 @@
           <a:p>
             <a:fld id="{DB35434F-B9E8-4EF6-A868-09CDA957E3B0}" type="datetimeFigureOut">
               <a:rPr lang="en-AU" smtClean="0"/>
-              <a:t>17/03/2024</a:t>
+              <a:t>18/03/2024</a:t>
             </a:fld>
             <a:endParaRPr lang="en-AU"/>
           </a:p>
@@ -2085,7 +2242,7 @@
           <a:p>
             <a:fld id="{DB35434F-B9E8-4EF6-A868-09CDA957E3B0}" type="datetimeFigureOut">
               <a:rPr lang="en-AU" smtClean="0"/>
-              <a:t>17/03/2024</a:t>
+              <a:t>18/03/2024</a:t>
             </a:fld>
             <a:endParaRPr lang="en-AU"/>
           </a:p>
@@ -2398,7 +2555,7 @@
           <a:p>
             <a:fld id="{DB35434F-B9E8-4EF6-A868-09CDA957E3B0}" type="datetimeFigureOut">
               <a:rPr lang="en-AU" smtClean="0"/>
-              <a:t>17/03/2024</a:t>
+              <a:t>18/03/2024</a:t>
             </a:fld>
             <a:endParaRPr lang="en-AU"/>
           </a:p>
@@ -2687,7 +2844,7 @@
           <a:p>
             <a:fld id="{DB35434F-B9E8-4EF6-A868-09CDA957E3B0}" type="datetimeFigureOut">
               <a:rPr lang="en-AU" smtClean="0"/>
-              <a:t>17/03/2024</a:t>
+              <a:t>18/03/2024</a:t>
             </a:fld>
             <a:endParaRPr lang="en-AU"/>
           </a:p>
@@ -2930,7 +3087,7 @@
           <a:p>
             <a:fld id="{DB35434F-B9E8-4EF6-A868-09CDA957E3B0}" type="datetimeFigureOut">
               <a:rPr lang="en-AU" smtClean="0"/>
-              <a:t>17/03/2024</a:t>
+              <a:t>18/03/2024</a:t>
             </a:fld>
             <a:endParaRPr lang="en-AU"/>
           </a:p>
@@ -3910,23 +4067,7 @@
                   <a:srgbClr val="FFFFFF"/>
                 </a:solidFill>
               </a:rPr>
-              <a:t>Data </a:t>
-            </a:r>
-            <a:r>
-              <a:rPr lang="en-US" sz="4800" dirty="0" err="1">
-                <a:solidFill>
-                  <a:srgbClr val="FFFFFF"/>
-                </a:solidFill>
-              </a:rPr>
-              <a:t>Visualisation</a:t>
-            </a:r>
-            <a:r>
-              <a:rPr lang="en-US" sz="4800" dirty="0">
-                <a:solidFill>
-                  <a:srgbClr val="FFFFFF"/>
-                </a:solidFill>
-              </a:rPr>
-              <a:t> Project</a:t>
+              <a:t>Project 3 </a:t>
             </a:r>
             <a:endParaRPr lang="en-AU" sz="4800" dirty="0">
               <a:solidFill>
@@ -3982,7 +4123,7 @@
             </a:r>
             <a:r>
               <a:rPr lang="en-US" dirty="0"/>
-              <a:t> Apr 24</a:t>
+              <a:t> March 24</a:t>
             </a:r>
             <a:endParaRPr lang="en-AU" dirty="0"/>
           </a:p>
@@ -11407,7 +11548,7 @@
                 <a:latin typeface="Calibri" panose="020F0502020204030204" pitchFamily="34" charset="0"/>
                 <a:cs typeface="Calibri" panose="020F0502020204030204" pitchFamily="34" charset="0"/>
               </a:rPr>
-              <a:t> - Commercial decisions can be made optimally based of current and potential sales opportunities</a:t>
+              <a:t> - Commercial decisions can be made optimally based on current and potential sales opportunities</a:t>
             </a:r>
             <a:endParaRPr lang="en-AU" sz="3200" dirty="0">
               <a:solidFill>
@@ -13986,7 +14127,7 @@
                 <a:latin typeface="Calibri" panose="020F0502020204030204" pitchFamily="34" charset="0"/>
                 <a:cs typeface="Calibri" panose="020F0502020204030204" pitchFamily="34" charset="0"/>
               </a:rPr>
-              <a:t> created using JavaScript</a:t>
+              <a:t> created using JavaScript / Pandas</a:t>
             </a:r>
             <a:br>
               <a:rPr lang="en-US" altLang="en-US" sz="2000" dirty="0">
@@ -14030,7 +14171,7 @@
                 <a:latin typeface="Calibri" panose="020F0502020204030204" pitchFamily="34" charset="0"/>
                 <a:cs typeface="Calibri" panose="020F0502020204030204" pitchFamily="34" charset="0"/>
               </a:rPr>
-              <a:t>Datasets over 200,000 records merged using Python</a:t>
+              <a:t>Datasets over 200,000 records merged using Pandas</a:t>
             </a:r>
             <a:br>
               <a:rPr lang="en-US" altLang="en-US" sz="2000" dirty="0">
@@ -15113,8 +15254,8 @@
         </p:blipFill>
         <p:spPr>
           <a:xfrm>
-            <a:off x="335279" y="541241"/>
-            <a:ext cx="9042400" cy="4535813"/>
+            <a:off x="220949" y="1619223"/>
+            <a:ext cx="5677861" cy="2848106"/>
           </a:xfrm>
           <a:prstGeom prst="rect">
             <a:avLst/>
@@ -15157,6 +15298,36 @@
           </a:p>
         </p:txBody>
       </p:sp>
+      <p:pic>
+        <p:nvPicPr>
+          <p:cNvPr id="8" name="Picture 7">
+            <a:extLst>
+              <a:ext uri="{FF2B5EF4-FFF2-40B4-BE49-F238E27FC236}">
+                <a16:creationId xmlns:a16="http://schemas.microsoft.com/office/drawing/2014/main" id="{CE8AE913-850F-E05E-1A8C-D3D76989F511}"/>
+              </a:ext>
+            </a:extLst>
+          </p:cNvPr>
+          <p:cNvPicPr>
+            <a:picLocks noChangeAspect="1"/>
+          </p:cNvPicPr>
+          <p:nvPr/>
+        </p:nvPicPr>
+        <p:blipFill>
+          <a:blip r:embed="rId3"/>
+          <a:stretch>
+            <a:fillRect/>
+          </a:stretch>
+        </p:blipFill>
+        <p:spPr>
+          <a:xfrm>
+            <a:off x="6462765" y="1474485"/>
+            <a:ext cx="4576325" cy="3778479"/>
+          </a:xfrm>
+          <a:prstGeom prst="rect">
+            <a:avLst/>
+          </a:prstGeom>
+        </p:spPr>
+      </p:pic>
     </p:spTree>
     <p:extLst>
       <p:ext uri="{BB962C8B-B14F-4D97-AF65-F5344CB8AC3E}">
@@ -15838,8 +16009,8 @@
         </p:blipFill>
         <p:spPr>
           <a:xfrm>
-            <a:off x="336223" y="593676"/>
-            <a:ext cx="8161891" cy="4366980"/>
+            <a:off x="212113" y="1212177"/>
+            <a:ext cx="5883887" cy="3148145"/>
           </a:xfrm>
           <a:prstGeom prst="rect">
             <a:avLst/>
@@ -15860,8 +16031,8 @@
         </p:nvSpPr>
         <p:spPr>
           <a:xfrm>
-            <a:off x="517236" y="5264727"/>
-            <a:ext cx="8069365" cy="369332"/>
+            <a:off x="524348" y="4593561"/>
+            <a:ext cx="8069365" cy="3139321"/>
           </a:xfrm>
           <a:prstGeom prst="rect">
             <a:avLst/>
@@ -15878,10 +16049,83 @@
               <a:rPr lang="en-US" dirty="0"/>
               <a:t>EV + HV sales have risen 600% in 10years 2013 to 2023</a:t>
             </a:r>
+          </a:p>
+          <a:p>
+            <a:endParaRPr lang="en-US" dirty="0"/>
+          </a:p>
+          <a:p>
+            <a:r>
+              <a:rPr lang="en-US" dirty="0"/>
+              <a:t>Left graph shows how much EV + HV models were bought every year</a:t>
+            </a:r>
+          </a:p>
+          <a:p>
+            <a:endParaRPr lang="en-US" dirty="0"/>
+          </a:p>
+          <a:p>
+            <a:r>
+              <a:rPr lang="en-US" dirty="0"/>
+              <a:t>Right Graph shows EV and HV as a rolling total</a:t>
+            </a:r>
+          </a:p>
+          <a:p>
+            <a:endParaRPr lang="en-US" dirty="0"/>
+          </a:p>
+          <a:p>
+            <a:r>
+              <a:rPr lang="en-US" dirty="0"/>
+              <a:t>Electric cars have an exponential growth, Hybrid cars have </a:t>
+            </a:r>
+            <a:r>
+              <a:rPr lang="en-US"/>
+              <a:t>linear growth</a:t>
+            </a:r>
+            <a:endParaRPr lang="en-US" dirty="0"/>
+          </a:p>
+          <a:p>
+            <a:endParaRPr lang="en-US" dirty="0"/>
+          </a:p>
+          <a:p>
+            <a:endParaRPr lang="en-US" dirty="0"/>
+          </a:p>
+          <a:p>
+            <a:endParaRPr lang="en-US" dirty="0"/>
+          </a:p>
+          <a:p>
             <a:endParaRPr lang="en-AU" dirty="0"/>
           </a:p>
         </p:txBody>
       </p:sp>
+      <p:pic>
+        <p:nvPicPr>
+          <p:cNvPr id="3" name="Picture 2">
+            <a:extLst>
+              <a:ext uri="{FF2B5EF4-FFF2-40B4-BE49-F238E27FC236}">
+                <a16:creationId xmlns:a16="http://schemas.microsoft.com/office/drawing/2014/main" id="{07454272-5128-CC0C-7CD8-20F045D05F91}"/>
+              </a:ext>
+            </a:extLst>
+          </p:cNvPr>
+          <p:cNvPicPr>
+            <a:picLocks noChangeAspect="1"/>
+          </p:cNvPicPr>
+          <p:nvPr/>
+        </p:nvPicPr>
+        <p:blipFill>
+          <a:blip r:embed="rId3"/>
+          <a:stretch>
+            <a:fillRect/>
+          </a:stretch>
+        </p:blipFill>
+        <p:spPr>
+          <a:xfrm>
+            <a:off x="6527277" y="1182221"/>
+            <a:ext cx="4830391" cy="3543865"/>
+          </a:xfrm>
+          <a:prstGeom prst="rect">
+            <a:avLst/>
+          </a:prstGeom>
+        </p:spPr>
+      </p:pic>
     </p:spTree>
     <p:extLst>
       <p:ext uri="{BB962C8B-B14F-4D97-AF65-F5344CB8AC3E}">
@@ -16555,7 +16799,7 @@
         </p:nvSpPr>
         <p:spPr>
           <a:xfrm>
-            <a:off x="517236" y="5264727"/>
+            <a:off x="517236" y="5256236"/>
             <a:ext cx="8069365" cy="923330"/>
           </a:xfrm>
           <a:prstGeom prst="rect">

</xml_diff>